<commit_message>
added few unit tests for user service, refactored it slightly to be more unit testable
</commit_message>
<xml_diff>
--- a/Presentation.pptx
+++ b/Presentation.pptx
@@ -7,6 +7,7 @@
   <p:sldIdLst>
     <p:sldId id="256" r:id="rId2"/>
     <p:sldId id="257" r:id="rId3"/>
+    <p:sldId id="258" r:id="rId4"/>
   </p:sldIdLst>
   <p:sldSz cx="9144000" cy="6858000" type="screen4x3"/>
   <p:notesSz cx="6858000" cy="9144000"/>
@@ -281,7 +282,7 @@
           <a:p>
             <a:fld id="{A77CB325-35BE-490D-9762-04AC27F674C3}" type="datetimeFigureOut">
               <a:rPr lang="en-US" smtClean="0"/>
-              <a:t>11/26/2012</a:t>
+              <a:t>12/1/2012</a:t>
             </a:fld>
             <a:endParaRPr lang="en-US"/>
           </a:p>
@@ -446,7 +447,7 @@
           <a:p>
             <a:fld id="{A77CB325-35BE-490D-9762-04AC27F674C3}" type="datetimeFigureOut">
               <a:rPr lang="en-US" smtClean="0"/>
-              <a:t>11/26/2012</a:t>
+              <a:t>12/1/2012</a:t>
             </a:fld>
             <a:endParaRPr lang="en-US"/>
           </a:p>
@@ -621,7 +622,7 @@
           <a:p>
             <a:fld id="{A77CB325-35BE-490D-9762-04AC27F674C3}" type="datetimeFigureOut">
               <a:rPr lang="en-US" smtClean="0"/>
-              <a:t>11/26/2012</a:t>
+              <a:t>12/1/2012</a:t>
             </a:fld>
             <a:endParaRPr lang="en-US"/>
           </a:p>
@@ -786,7 +787,7 @@
           <a:p>
             <a:fld id="{A77CB325-35BE-490D-9762-04AC27F674C3}" type="datetimeFigureOut">
               <a:rPr lang="en-US" smtClean="0"/>
-              <a:t>11/26/2012</a:t>
+              <a:t>12/1/2012</a:t>
             </a:fld>
             <a:endParaRPr lang="en-US"/>
           </a:p>
@@ -1028,7 +1029,7 @@
           <a:p>
             <a:fld id="{A77CB325-35BE-490D-9762-04AC27F674C3}" type="datetimeFigureOut">
               <a:rPr lang="en-US" smtClean="0"/>
-              <a:t>11/26/2012</a:t>
+              <a:t>12/1/2012</a:t>
             </a:fld>
             <a:endParaRPr lang="en-US"/>
           </a:p>
@@ -1292,7 +1293,7 @@
           <a:p>
             <a:fld id="{A77CB325-35BE-490D-9762-04AC27F674C3}" type="datetimeFigureOut">
               <a:rPr lang="en-US" smtClean="0"/>
-              <a:t>11/26/2012</a:t>
+              <a:t>12/1/2012</a:t>
             </a:fld>
             <a:endParaRPr lang="en-US"/>
           </a:p>
@@ -1670,7 +1671,7 @@
           <a:p>
             <a:fld id="{A77CB325-35BE-490D-9762-04AC27F674C3}" type="datetimeFigureOut">
               <a:rPr lang="en-US" smtClean="0"/>
-              <a:t>11/26/2012</a:t>
+              <a:t>12/1/2012</a:t>
             </a:fld>
             <a:endParaRPr lang="en-US"/>
           </a:p>
@@ -1820,7 +1821,7 @@
           <a:p>
             <a:fld id="{A77CB325-35BE-490D-9762-04AC27F674C3}" type="datetimeFigureOut">
               <a:rPr lang="en-US" smtClean="0"/>
-              <a:t>11/26/2012</a:t>
+              <a:t>12/1/2012</a:t>
             </a:fld>
             <a:endParaRPr lang="en-US"/>
           </a:p>
@@ -1910,7 +1911,7 @@
           <a:p>
             <a:fld id="{A77CB325-35BE-490D-9762-04AC27F674C3}" type="datetimeFigureOut">
               <a:rPr lang="en-US" smtClean="0"/>
-              <a:t>11/26/2012</a:t>
+              <a:t>12/1/2012</a:t>
             </a:fld>
             <a:endParaRPr lang="en-US"/>
           </a:p>
@@ -2171,7 +2172,7 @@
           <a:p>
             <a:fld id="{A77CB325-35BE-490D-9762-04AC27F674C3}" type="datetimeFigureOut">
               <a:rPr lang="en-US" smtClean="0"/>
-              <a:t>11/26/2012</a:t>
+              <a:t>12/1/2012</a:t>
             </a:fld>
             <a:endParaRPr lang="en-US"/>
           </a:p>
@@ -2459,7 +2460,7 @@
           <a:p>
             <a:fld id="{A77CB325-35BE-490D-9762-04AC27F674C3}" type="datetimeFigureOut">
               <a:rPr lang="en-US" smtClean="0"/>
-              <a:t>11/26/2012</a:t>
+              <a:t>12/1/2012</a:t>
             </a:fld>
             <a:endParaRPr lang="en-US"/>
           </a:p>
@@ -3230,7 +3231,7 @@
           <a:p>
             <a:fld id="{A77CB325-35BE-490D-9762-04AC27F674C3}" type="datetimeFigureOut">
               <a:rPr lang="en-US" smtClean="0"/>
-              <a:t>11/26/2012</a:t>
+              <a:t>12/1/2012</a:t>
             </a:fld>
             <a:endParaRPr lang="en-US"/>
           </a:p>
@@ -3951,29 +3952,70 @@
         </p:nvSpPr>
         <p:spPr/>
         <p:txBody>
+          <a:bodyPr>
+            <a:normAutofit/>
+          </a:bodyPr>
+          <a:lstStyle/>
+          <a:p>
+            <a:r>
+              <a:rPr lang="en-CA" dirty="0" smtClean="0"/>
+              <a:t>Our Goal</a:t>
+            </a:r>
+            <a:endParaRPr lang="en-US" dirty="0"/>
+          </a:p>
+        </p:txBody>
+      </p:sp>
+      <p:sp>
+        <p:nvSpPr>
+          <p:cNvPr id="2" name="Content Placeholder 1"/>
+          <p:cNvSpPr>
+            <a:spLocks noGrp="1"/>
+          </p:cNvSpPr>
+          <p:nvPr>
+            <p:ph idx="1"/>
+          </p:nvPr>
+        </p:nvSpPr>
+        <p:spPr/>
+        <p:txBody>
           <a:bodyPr/>
           <a:lstStyle/>
           <a:p>
-            <a:endParaRPr lang="en-US" dirty="0"/>
-          </a:p>
-        </p:txBody>
-      </p:sp>
-      <p:sp>
-        <p:nvSpPr>
-          <p:cNvPr id="2" name="Content Placeholder 1"/>
-          <p:cNvSpPr>
-            <a:spLocks noGrp="1"/>
-          </p:cNvSpPr>
-          <p:nvPr>
-            <p:ph idx="1"/>
-          </p:nvPr>
-        </p:nvSpPr>
-        <p:spPr/>
-        <p:txBody>
-          <a:bodyPr/>
-          <a:lstStyle/>
-          <a:p>
-            <a:endParaRPr lang="en-US" dirty="0"/>
+            <a:r>
+              <a:rPr lang="en-CA" dirty="0" smtClean="0"/>
+              <a:t>Provide a solution </a:t>
+            </a:r>
+            <a:r>
+              <a:rPr lang="en-CA" dirty="0" smtClean="0"/>
+              <a:t>that is</a:t>
+            </a:r>
+          </a:p>
+          <a:p>
+            <a:pPr lvl="1"/>
+            <a:r>
+              <a:rPr lang="en-CA" dirty="0" smtClean="0"/>
+              <a:t>Scalable</a:t>
+            </a:r>
+          </a:p>
+          <a:p>
+            <a:pPr lvl="1"/>
+            <a:r>
+              <a:rPr lang="en-CA" dirty="0" smtClean="0"/>
+              <a:t>Expandable</a:t>
+            </a:r>
+          </a:p>
+          <a:p>
+            <a:pPr lvl="1"/>
+            <a:r>
+              <a:rPr lang="en-CA" dirty="0" smtClean="0"/>
+              <a:t>Maintainable</a:t>
+            </a:r>
+          </a:p>
+          <a:p>
+            <a:pPr lvl="1"/>
+            <a:r>
+              <a:rPr lang="en-CA" dirty="0" smtClean="0"/>
+              <a:t>Cost-effective</a:t>
+            </a:r>
           </a:p>
         </p:txBody>
       </p:sp>
@@ -3981,6 +4023,108 @@
     <p:extLst>
       <p:ext uri="{BB962C8B-B14F-4D97-AF65-F5344CB8AC3E}">
         <p14:creationId xmlns:p14="http://schemas.microsoft.com/office/powerpoint/2010/main" val="4026799835"/>
+      </p:ext>
+    </p:extLst>
+  </p:cSld>
+  <p:clrMapOvr>
+    <a:masterClrMapping/>
+  </p:clrMapOvr>
+</p:sld>
+</file>
+
+<file path=ppt/slides/slide3.xml><?xml version="1.0" encoding="utf-8"?>
+<p:sld xmlns:a="http://schemas.openxmlformats.org/drawingml/2006/main" xmlns:r="http://schemas.openxmlformats.org/officeDocument/2006/relationships" xmlns:p="http://schemas.openxmlformats.org/presentationml/2006/main">
+  <p:cSld>
+    <p:spTree>
+      <p:nvGrpSpPr>
+        <p:cNvPr id="1" name=""/>
+        <p:cNvGrpSpPr/>
+        <p:nvPr/>
+      </p:nvGrpSpPr>
+      <p:grpSpPr>
+        <a:xfrm>
+          <a:off x="0" y="0"/>
+          <a:ext cx="0" cy="0"/>
+          <a:chOff x="0" y="0"/>
+          <a:chExt cx="0" cy="0"/>
+        </a:xfrm>
+      </p:grpSpPr>
+      <p:sp>
+        <p:nvSpPr>
+          <p:cNvPr id="2" name="Title 1"/>
+          <p:cNvSpPr>
+            <a:spLocks noGrp="1"/>
+          </p:cNvSpPr>
+          <p:nvPr>
+            <p:ph type="title"/>
+          </p:nvPr>
+        </p:nvSpPr>
+        <p:spPr/>
+        <p:txBody>
+          <a:bodyPr/>
+          <a:lstStyle/>
+          <a:p>
+            <a:r>
+              <a:rPr lang="en-CA" dirty="0" smtClean="0"/>
+              <a:t>Our Platform</a:t>
+            </a:r>
+            <a:endParaRPr lang="en-US" dirty="0"/>
+          </a:p>
+        </p:txBody>
+      </p:sp>
+      <p:sp>
+        <p:nvSpPr>
+          <p:cNvPr id="3" name="Content Placeholder 2"/>
+          <p:cNvSpPr>
+            <a:spLocks noGrp="1"/>
+          </p:cNvSpPr>
+          <p:nvPr>
+            <p:ph idx="1"/>
+          </p:nvPr>
+        </p:nvSpPr>
+        <p:spPr/>
+        <p:txBody>
+          <a:bodyPr/>
+          <a:lstStyle/>
+          <a:p>
+            <a:r>
+              <a:rPr lang="en-CA" dirty="0" smtClean="0"/>
+              <a:t>ASP.NET MVC 3</a:t>
+            </a:r>
+          </a:p>
+          <a:p>
+            <a:r>
+              <a:rPr lang="en-CA" dirty="0" smtClean="0"/>
+              <a:t>Entity Framework 4.1</a:t>
+            </a:r>
+          </a:p>
+          <a:p>
+            <a:r>
+              <a:rPr lang="en-CA" dirty="0" err="1" smtClean="0"/>
+              <a:t>jqGrid</a:t>
+            </a:r>
+            <a:endParaRPr lang="en-CA" dirty="0" smtClean="0"/>
+          </a:p>
+          <a:p>
+            <a:r>
+              <a:rPr lang="en-CA" dirty="0" err="1" smtClean="0"/>
+              <a:t>Highcharts</a:t>
+            </a:r>
+            <a:endParaRPr lang="en-CA" dirty="0" smtClean="0"/>
+          </a:p>
+          <a:p>
+            <a:r>
+              <a:rPr lang="en-CA" smtClean="0"/>
+              <a:t>Ninject</a:t>
+            </a:r>
+            <a:endParaRPr lang="en-US" dirty="0"/>
+          </a:p>
+        </p:txBody>
+      </p:sp>
+    </p:spTree>
+    <p:extLst>
+      <p:ext uri="{BB962C8B-B14F-4D97-AF65-F5344CB8AC3E}">
+        <p14:creationId xmlns:p14="http://schemas.microsoft.com/office/powerpoint/2010/main" val="1288511295"/>
       </p:ext>
     </p:extLst>
   </p:cSld>

</xml_diff>